<commit_message>
Update resulted graphs and presentation
</commit_message>
<xml_diff>
--- a/Presentation_Project2.pptx
+++ b/Presentation_Project2.pptx
@@ -219,7 +219,7 @@
           <a:p>
             <a:fld id="{A7DCB159-4812-4CEE-AD9E-7BC578B5BB2A}" type="datetimeFigureOut">
               <a:rPr lang="bg-BG" smtClean="0"/>
-              <a:t>28.1.2023 г.</a:t>
+              <a:t>29.1.2023 г.</a:t>
             </a:fld>
             <a:endParaRPr lang="bg-BG"/>
           </a:p>
@@ -10673,13 +10673,13 @@
   <p:clrMapOvr>
     <a:masterClrMapping/>
   </p:clrMapOvr>
-  <mc:AlternateContent xmlns:mc="http://schemas.openxmlformats.org/markup-compatibility/2006">
-    <mc:Choice xmlns:p14="http://schemas.microsoft.com/office/powerpoint/2010/main" Requires="p14">
+  <mc:AlternateContent xmlns:mc="http://schemas.openxmlformats.org/markup-compatibility/2006" xmlns:p14="http://schemas.microsoft.com/office/powerpoint/2010/main">
+    <mc:Choice Requires="p14">
       <p:transition spd="slow" p14:dur="2500">
         <p:checker/>
       </p:transition>
     </mc:Choice>
-    <mc:Fallback>
+    <mc:Fallback xmlns="">
       <p:transition spd="slow">
         <p:checker/>
       </p:transition>
@@ -12008,7 +12008,7 @@
       </p:sp>
       <p:pic>
         <p:nvPicPr>
-          <p:cNvPr id="7" name="Picture 6" descr="A picture containing sky, line, day&#10;&#10;Description automatically generated">
+          <p:cNvPr id="7" name="Picture 6">
             <a:extLst>
               <a:ext uri="{FF2B5EF4-FFF2-40B4-BE49-F238E27FC236}">
                 <a16:creationId xmlns:a16="http://schemas.microsoft.com/office/drawing/2014/main" id="{52D9A6FA-CFDA-65D0-2946-46A78A827421}"/>
@@ -12028,9 +12028,8 @@
               </a:ext>
             </a:extLst>
           </a:blip>
-          <a:stretch>
-            <a:fillRect/>
-          </a:stretch>
+          <a:srcRect/>
+          <a:stretch/>
         </p:blipFill>
         <p:spPr>
           <a:xfrm>
@@ -12116,13 +12115,13 @@
   <p:clrMapOvr>
     <a:masterClrMapping/>
   </p:clrMapOvr>
-  <mc:AlternateContent xmlns:mc="http://schemas.openxmlformats.org/markup-compatibility/2006">
-    <mc:Choice xmlns:p14="http://schemas.microsoft.com/office/powerpoint/2010/main" Requires="p14">
+  <mc:AlternateContent xmlns:mc="http://schemas.openxmlformats.org/markup-compatibility/2006" xmlns:p14="http://schemas.microsoft.com/office/powerpoint/2010/main">
+    <mc:Choice Requires="p14">
       <p:transition spd="slow" p14:dur="1500">
         <p:split orient="vert"/>
       </p:transition>
     </mc:Choice>
-    <mc:Fallback>
+    <mc:Fallback xmlns="">
       <p:transition spd="slow">
         <p:split orient="vert"/>
       </p:transition>
@@ -12777,7 +12776,7 @@
       </p:sp>
       <p:pic>
         <p:nvPicPr>
-          <p:cNvPr id="5" name="Picture 4" descr="A picture containing sky&#10;&#10;Description automatically generated">
+          <p:cNvPr id="5" name="Picture 4">
             <a:extLst>
               <a:ext uri="{FF2B5EF4-FFF2-40B4-BE49-F238E27FC236}">
                 <a16:creationId xmlns:a16="http://schemas.microsoft.com/office/drawing/2014/main" id="{0E9A68FF-A88B-CAF2-1CB4-C633391D75E2}"/>
@@ -12797,9 +12796,8 @@
               </a:ext>
             </a:extLst>
           </a:blip>
-          <a:stretch>
-            <a:fillRect/>
-          </a:stretch>
+          <a:srcRect/>
+          <a:stretch/>
         </p:blipFill>
         <p:spPr>
           <a:xfrm>
@@ -12885,13 +12883,13 @@
   <p:clrMapOvr>
     <a:masterClrMapping/>
   </p:clrMapOvr>
-  <mc:AlternateContent xmlns:mc="http://schemas.openxmlformats.org/markup-compatibility/2006">
-    <mc:Choice xmlns:p14="http://schemas.microsoft.com/office/powerpoint/2010/main" Requires="p14">
+  <mc:AlternateContent xmlns:mc="http://schemas.openxmlformats.org/markup-compatibility/2006" xmlns:p14="http://schemas.microsoft.com/office/powerpoint/2010/main">
+    <mc:Choice Requires="p14">
       <p:transition spd="slow" p14:dur="1500">
         <p:split orient="vert"/>
       </p:transition>
     </mc:Choice>
-    <mc:Fallback>
+    <mc:Fallback xmlns="">
       <p:transition spd="slow">
         <p:split orient="vert"/>
       </p:transition>
@@ -13500,7 +13498,7 @@
       </p:sp>
       <p:pic>
         <p:nvPicPr>
-          <p:cNvPr id="7" name="Picture 6" descr="A picture containing sky, different, day&#10;&#10;Description automatically generated">
+          <p:cNvPr id="7" name="Picture 6">
             <a:extLst>
               <a:ext uri="{FF2B5EF4-FFF2-40B4-BE49-F238E27FC236}">
                 <a16:creationId xmlns:a16="http://schemas.microsoft.com/office/drawing/2014/main" id="{DAE58FD7-2A6E-603D-CC3B-7378D0DC938A}"/>
@@ -13520,9 +13518,8 @@
               </a:ext>
             </a:extLst>
           </a:blip>
-          <a:stretch>
-            <a:fillRect/>
-          </a:stretch>
+          <a:srcRect/>
+          <a:stretch/>
         </p:blipFill>
         <p:spPr>
           <a:xfrm>
@@ -13608,13 +13605,13 @@
   <p:clrMapOvr>
     <a:masterClrMapping/>
   </p:clrMapOvr>
-  <mc:AlternateContent xmlns:mc="http://schemas.openxmlformats.org/markup-compatibility/2006">
-    <mc:Choice xmlns:p14="http://schemas.microsoft.com/office/powerpoint/2010/main" Requires="p14">
+  <mc:AlternateContent xmlns:mc="http://schemas.openxmlformats.org/markup-compatibility/2006" xmlns:p14="http://schemas.microsoft.com/office/powerpoint/2010/main">
+    <mc:Choice Requires="p14">
       <p:transition spd="slow" p14:dur="1500">
         <p:split orient="vert"/>
       </p:transition>
     </mc:Choice>
-    <mc:Fallback>
+    <mc:Fallback xmlns="">
       <p:transition spd="slow">
         <p:split orient="vert"/>
       </p:transition>
@@ -14269,7 +14266,7 @@
       </p:sp>
       <p:pic>
         <p:nvPicPr>
-          <p:cNvPr id="5" name="Picture 4" descr="A picture containing sky, different, various, day&#10;&#10;Description automatically generated">
+          <p:cNvPr id="5" name="Picture 4">
             <a:extLst>
               <a:ext uri="{FF2B5EF4-FFF2-40B4-BE49-F238E27FC236}">
                 <a16:creationId xmlns:a16="http://schemas.microsoft.com/office/drawing/2014/main" id="{605DDE9D-02E8-CF0A-ED0F-90B7DA869FA8}"/>
@@ -14289,9 +14286,8 @@
               </a:ext>
             </a:extLst>
           </a:blip>
-          <a:stretch>
-            <a:fillRect/>
-          </a:stretch>
+          <a:srcRect/>
+          <a:stretch/>
         </p:blipFill>
         <p:spPr>
           <a:xfrm>
@@ -14377,13 +14373,13 @@
   <p:clrMapOvr>
     <a:masterClrMapping/>
   </p:clrMapOvr>
-  <mc:AlternateContent xmlns:mc="http://schemas.openxmlformats.org/markup-compatibility/2006">
-    <mc:Choice xmlns:p14="http://schemas.microsoft.com/office/powerpoint/2010/main" Requires="p14">
+  <mc:AlternateContent xmlns:mc="http://schemas.openxmlformats.org/markup-compatibility/2006" xmlns:p14="http://schemas.microsoft.com/office/powerpoint/2010/main">
+    <mc:Choice Requires="p14">
       <p:transition spd="slow" p14:dur="1500">
         <p:split orient="vert"/>
       </p:transition>
     </mc:Choice>
-    <mc:Fallback>
+    <mc:Fallback xmlns="">
       <p:transition spd="slow">
         <p:split orient="vert"/>
       </p:transition>

</xml_diff>